<commit_message>
Fixed missing mux selection indicators
</commit_message>
<xml_diff>
--- a/rsa_fpga/circuit.pptx
+++ b/rsa_fpga/circuit.pptx
@@ -105,6 +105,11 @@
       </a:defRPr>
     </a:lvl9pPr>
   </p:defaultTextStyle>
+  <p:extLst>
+    <p:ext uri="{EFAFB233-063F-42B5-8137-9DF3F51BA10A}">
+      <p15:sldGuideLst xmlns:p15="http://schemas.microsoft.com/office/powerpoint/2012/main"/>
+    </p:ext>
+  </p:extLst>
 </p:presentation>
 </file>
 
@@ -289,7 +294,7 @@
           <a:p>
             <a:fld id="{A9B36D06-608C-584C-B52E-55DB91756EA2}" type="datetimeFigureOut">
               <a:rPr lang="en-US" smtClean="0"/>
-              <a:t>6/19/16</a:t>
+              <a:t>6/26/2016</a:t>
             </a:fld>
             <a:endParaRPr lang="en-US"/>
           </a:p>
@@ -459,7 +464,7 @@
           <a:p>
             <a:fld id="{A9B36D06-608C-584C-B52E-55DB91756EA2}" type="datetimeFigureOut">
               <a:rPr lang="en-US" smtClean="0"/>
-              <a:t>6/19/16</a:t>
+              <a:t>6/26/2016</a:t>
             </a:fld>
             <a:endParaRPr lang="en-US"/>
           </a:p>
@@ -639,7 +644,7 @@
           <a:p>
             <a:fld id="{A9B36D06-608C-584C-B52E-55DB91756EA2}" type="datetimeFigureOut">
               <a:rPr lang="en-US" smtClean="0"/>
-              <a:t>6/19/16</a:t>
+              <a:t>6/26/2016</a:t>
             </a:fld>
             <a:endParaRPr lang="en-US"/>
           </a:p>
@@ -809,7 +814,7 @@
           <a:p>
             <a:fld id="{A9B36D06-608C-584C-B52E-55DB91756EA2}" type="datetimeFigureOut">
               <a:rPr lang="en-US" smtClean="0"/>
-              <a:t>6/19/16</a:t>
+              <a:t>6/26/2016</a:t>
             </a:fld>
             <a:endParaRPr lang="en-US"/>
           </a:p>
@@ -1055,7 +1060,7 @@
           <a:p>
             <a:fld id="{A9B36D06-608C-584C-B52E-55DB91756EA2}" type="datetimeFigureOut">
               <a:rPr lang="en-US" smtClean="0"/>
-              <a:t>6/19/16</a:t>
+              <a:t>6/26/2016</a:t>
             </a:fld>
             <a:endParaRPr lang="en-US"/>
           </a:p>
@@ -1343,7 +1348,7 @@
           <a:p>
             <a:fld id="{A9B36D06-608C-584C-B52E-55DB91756EA2}" type="datetimeFigureOut">
               <a:rPr lang="en-US" smtClean="0"/>
-              <a:t>6/19/16</a:t>
+              <a:t>6/26/2016</a:t>
             </a:fld>
             <a:endParaRPr lang="en-US"/>
           </a:p>
@@ -1765,7 +1770,7 @@
           <a:p>
             <a:fld id="{A9B36D06-608C-584C-B52E-55DB91756EA2}" type="datetimeFigureOut">
               <a:rPr lang="en-US" smtClean="0"/>
-              <a:t>6/19/16</a:t>
+              <a:t>6/26/2016</a:t>
             </a:fld>
             <a:endParaRPr lang="en-US"/>
           </a:p>
@@ -1883,7 +1888,7 @@
           <a:p>
             <a:fld id="{A9B36D06-608C-584C-B52E-55DB91756EA2}" type="datetimeFigureOut">
               <a:rPr lang="en-US" smtClean="0"/>
-              <a:t>6/19/16</a:t>
+              <a:t>6/26/2016</a:t>
             </a:fld>
             <a:endParaRPr lang="en-US"/>
           </a:p>
@@ -1978,7 +1983,7 @@
           <a:p>
             <a:fld id="{A9B36D06-608C-584C-B52E-55DB91756EA2}" type="datetimeFigureOut">
               <a:rPr lang="en-US" smtClean="0"/>
-              <a:t>6/19/16</a:t>
+              <a:t>6/26/2016</a:t>
             </a:fld>
             <a:endParaRPr lang="en-US"/>
           </a:p>
@@ -2255,7 +2260,7 @@
           <a:p>
             <a:fld id="{A9B36D06-608C-584C-B52E-55DB91756EA2}" type="datetimeFigureOut">
               <a:rPr lang="en-US" smtClean="0"/>
-              <a:t>6/19/16</a:t>
+              <a:t>6/26/2016</a:t>
             </a:fld>
             <a:endParaRPr lang="en-US"/>
           </a:p>
@@ -2512,7 +2517,7 @@
           <a:p>
             <a:fld id="{A9B36D06-608C-584C-B52E-55DB91756EA2}" type="datetimeFigureOut">
               <a:rPr lang="en-US" smtClean="0"/>
-              <a:t>6/19/16</a:t>
+              <a:t>6/26/2016</a:t>
             </a:fld>
             <a:endParaRPr lang="en-US"/>
           </a:p>
@@ -2725,7 +2730,7 @@
           <a:p>
             <a:fld id="{A9B36D06-608C-584C-B52E-55DB91756EA2}" type="datetimeFigureOut">
               <a:rPr lang="en-US" smtClean="0"/>
-              <a:t>6/19/16</a:t>
+              <a:t>6/26/2016</a:t>
             </a:fld>
             <a:endParaRPr lang="en-US"/>
           </a:p>
@@ -7184,7 +7189,7 @@
         </p:nvCxnSpPr>
         <p:spPr>
           <a:xfrm flipH="1">
-            <a:off x="3895479" y="961237"/>
+            <a:off x="3904188" y="961237"/>
             <a:ext cx="2659" cy="1526656"/>
           </a:xfrm>
           <a:prstGeom prst="line">
@@ -7995,6 +8000,186 @@
               <a:t>done_internal</a:t>
             </a:r>
             <a:endParaRPr lang="en-US" sz="1000" dirty="0"/>
+          </a:p>
+        </p:txBody>
+      </p:sp>
+      <p:sp>
+        <p:nvSpPr>
+          <p:cNvPr id="2" name="TextBox 1"/>
+          <p:cNvSpPr txBox="1"/>
+          <p:nvPr/>
+        </p:nvSpPr>
+        <p:spPr>
+          <a:xfrm>
+            <a:off x="1631861" y="2219287"/>
+            <a:ext cx="777300" cy="261610"/>
+          </a:xfrm>
+          <a:prstGeom prst="rect">
+            <a:avLst/>
+          </a:prstGeom>
+          <a:noFill/>
+        </p:spPr>
+        <p:txBody>
+          <a:bodyPr wrap="square" rtlCol="0">
+            <a:spAutoFit/>
+          </a:bodyPr>
+          <a:lstStyle/>
+          <a:p>
+            <a:r>
+              <a:rPr lang="pt-BR" sz="1100" dirty="0" smtClean="0"/>
+              <a:t>1           0</a:t>
+            </a:r>
+            <a:endParaRPr lang="pt-BR" sz="1100" dirty="0"/>
+          </a:p>
+        </p:txBody>
+      </p:sp>
+      <p:sp>
+        <p:nvSpPr>
+          <p:cNvPr id="154" name="TextBox 153"/>
+          <p:cNvSpPr txBox="1"/>
+          <p:nvPr/>
+        </p:nvSpPr>
+        <p:spPr>
+          <a:xfrm>
+            <a:off x="5607672" y="1426193"/>
+            <a:ext cx="777300" cy="261610"/>
+          </a:xfrm>
+          <a:prstGeom prst="rect">
+            <a:avLst/>
+          </a:prstGeom>
+          <a:noFill/>
+        </p:spPr>
+        <p:txBody>
+          <a:bodyPr wrap="square" rtlCol="0">
+            <a:spAutoFit/>
+          </a:bodyPr>
+          <a:lstStyle/>
+          <a:p>
+            <a:r>
+              <a:rPr lang="pt-BR" sz="1100" dirty="0" smtClean="0"/>
+              <a:t>1           0</a:t>
+            </a:r>
+            <a:endParaRPr lang="pt-BR" sz="1100" dirty="0"/>
+          </a:p>
+        </p:txBody>
+      </p:sp>
+      <p:sp>
+        <p:nvSpPr>
+          <p:cNvPr id="155" name="TextBox 154"/>
+          <p:cNvSpPr txBox="1"/>
+          <p:nvPr/>
+        </p:nvSpPr>
+        <p:spPr>
+          <a:xfrm>
+            <a:off x="7252502" y="1413124"/>
+            <a:ext cx="777300" cy="261610"/>
+          </a:xfrm>
+          <a:prstGeom prst="rect">
+            <a:avLst/>
+          </a:prstGeom>
+          <a:noFill/>
+        </p:spPr>
+        <p:txBody>
+          <a:bodyPr wrap="square" rtlCol="0">
+            <a:spAutoFit/>
+          </a:bodyPr>
+          <a:lstStyle/>
+          <a:p>
+            <a:r>
+              <a:rPr lang="pt-BR" sz="1100" dirty="0" smtClean="0"/>
+              <a:t>1           0</a:t>
+            </a:r>
+            <a:endParaRPr lang="pt-BR" sz="1100" dirty="0"/>
+          </a:p>
+        </p:txBody>
+      </p:sp>
+      <p:sp>
+        <p:nvSpPr>
+          <p:cNvPr id="157" name="TextBox 156"/>
+          <p:cNvSpPr txBox="1"/>
+          <p:nvPr/>
+        </p:nvSpPr>
+        <p:spPr>
+          <a:xfrm>
+            <a:off x="5347181" y="2315227"/>
+            <a:ext cx="777300" cy="261610"/>
+          </a:xfrm>
+          <a:prstGeom prst="rect">
+            <a:avLst/>
+          </a:prstGeom>
+          <a:noFill/>
+        </p:spPr>
+        <p:txBody>
+          <a:bodyPr wrap="square" rtlCol="0">
+            <a:spAutoFit/>
+          </a:bodyPr>
+          <a:lstStyle/>
+          <a:p>
+            <a:r>
+              <a:rPr lang="pt-BR" sz="1100" dirty="0" smtClean="0"/>
+              <a:t>1             0</a:t>
+            </a:r>
+            <a:endParaRPr lang="pt-BR" sz="1100" dirty="0"/>
+          </a:p>
+        </p:txBody>
+      </p:sp>
+      <p:sp>
+        <p:nvSpPr>
+          <p:cNvPr id="159" name="TextBox 158"/>
+          <p:cNvSpPr txBox="1"/>
+          <p:nvPr/>
+        </p:nvSpPr>
+        <p:spPr>
+          <a:xfrm>
+            <a:off x="7436614" y="2302614"/>
+            <a:ext cx="777300" cy="261610"/>
+          </a:xfrm>
+          <a:prstGeom prst="rect">
+            <a:avLst/>
+          </a:prstGeom>
+          <a:noFill/>
+        </p:spPr>
+        <p:txBody>
+          <a:bodyPr wrap="square" rtlCol="0">
+            <a:spAutoFit/>
+          </a:bodyPr>
+          <a:lstStyle/>
+          <a:p>
+            <a:r>
+              <a:rPr lang="pt-BR" sz="1100" dirty="0" smtClean="0"/>
+              <a:t>1           0</a:t>
+            </a:r>
+            <a:endParaRPr lang="pt-BR" sz="1100" dirty="0"/>
+          </a:p>
+        </p:txBody>
+      </p:sp>
+      <p:sp>
+        <p:nvSpPr>
+          <p:cNvPr id="160" name="TextBox 159"/>
+          <p:cNvSpPr txBox="1"/>
+          <p:nvPr/>
+        </p:nvSpPr>
+        <p:spPr>
+          <a:xfrm>
+            <a:off x="6351873" y="4709772"/>
+            <a:ext cx="777300" cy="261610"/>
+          </a:xfrm>
+          <a:prstGeom prst="rect">
+            <a:avLst/>
+          </a:prstGeom>
+          <a:noFill/>
+        </p:spPr>
+        <p:txBody>
+          <a:bodyPr wrap="square" rtlCol="0">
+            <a:spAutoFit/>
+          </a:bodyPr>
+          <a:lstStyle/>
+          <a:p>
+            <a:r>
+              <a:rPr lang="pt-BR" sz="1100" dirty="0" smtClean="0"/>
+              <a:t>1           0</a:t>
+            </a:r>
+            <a:endParaRPr lang="pt-BR" sz="1100" dirty="0"/>
           </a:p>
         </p:txBody>
       </p:sp>
@@ -10531,6 +10716,66 @@
           </a:p>
         </p:txBody>
       </p:sp>
+      <p:sp>
+        <p:nvSpPr>
+          <p:cNvPr id="77" name="TextBox 76"/>
+          <p:cNvSpPr txBox="1"/>
+          <p:nvPr/>
+        </p:nvSpPr>
+        <p:spPr>
+          <a:xfrm>
+            <a:off x="1612906" y="2213887"/>
+            <a:ext cx="777300" cy="261610"/>
+          </a:xfrm>
+          <a:prstGeom prst="rect">
+            <a:avLst/>
+          </a:prstGeom>
+          <a:noFill/>
+        </p:spPr>
+        <p:txBody>
+          <a:bodyPr wrap="square" rtlCol="0">
+            <a:spAutoFit/>
+          </a:bodyPr>
+          <a:lstStyle/>
+          <a:p>
+            <a:r>
+              <a:rPr lang="pt-BR" sz="1100" dirty="0" smtClean="0"/>
+              <a:t>1           0</a:t>
+            </a:r>
+            <a:endParaRPr lang="pt-BR" sz="1100" dirty="0"/>
+          </a:p>
+        </p:txBody>
+      </p:sp>
+      <p:sp>
+        <p:nvSpPr>
+          <p:cNvPr id="80" name="TextBox 79"/>
+          <p:cNvSpPr txBox="1"/>
+          <p:nvPr/>
+        </p:nvSpPr>
+        <p:spPr>
+          <a:xfrm rot="16200000">
+            <a:off x="2458478" y="4494378"/>
+            <a:ext cx="777300" cy="261610"/>
+          </a:xfrm>
+          <a:prstGeom prst="rect">
+            <a:avLst/>
+          </a:prstGeom>
+          <a:noFill/>
+        </p:spPr>
+        <p:txBody>
+          <a:bodyPr wrap="square" rtlCol="0">
+            <a:spAutoFit/>
+          </a:bodyPr>
+          <a:lstStyle/>
+          <a:p>
+            <a:r>
+              <a:rPr lang="pt-BR" sz="1100" dirty="0" smtClean="0"/>
+              <a:t>1           0</a:t>
+            </a:r>
+            <a:endParaRPr lang="pt-BR" sz="1100" dirty="0"/>
+          </a:p>
+        </p:txBody>
+      </p:sp>
     </p:spTree>
     <p:extLst>
       <p:ext uri="{BB962C8B-B14F-4D97-AF65-F5344CB8AC3E}">

</xml_diff>